<commit_message>
Change copyright notice from Inc. to PBC
</commit_message>
<xml_diff>
--- a/mosaic-cheatsheet-gf.pptx
+++ b/mosaic-cheatsheet-gf.pptx
@@ -2828,7 +2828,7 @@
               <a:t>® is a trademark of </a:t>
             </a:r>
             <a:r>
-              <a:rPr lang="en-US" sz="900" b="0" strike="noStrike" spc="-1" dirty="0" err="1">
+              <a:rPr lang="en-US" sz="900" b="0" strike="noStrike" spc="-1" dirty="0" err="1" smtClean="0">
                 <a:solidFill>
                   <a:srgbClr val="000000"/>
                 </a:solidFill>
@@ -2838,14 +2838,44 @@
               <a:t>RStudio</a:t>
             </a:r>
             <a:r>
-              <a:rPr lang="en-US" sz="900" b="0" strike="noStrike" spc="-1" dirty="0">
+              <a:rPr lang="en-US" sz="900" b="0" strike="noStrike" spc="-1" dirty="0" smtClean="0">
                 <a:solidFill>
                   <a:srgbClr val="000000"/>
                 </a:solidFill>
                 <a:latin typeface="Source Sans Pro Light"/>
                 <a:ea typeface="Source Sans Pro Light"/>
               </a:rPr>
-              <a:t>, Inc.  •  </a:t>
+              <a:t>, </a:t>
+            </a:r>
+            <a:r>
+              <a:rPr lang="en-US" sz="900" spc="-1" dirty="0" smtClean="0">
+                <a:solidFill>
+                  <a:srgbClr val="000000"/>
+                </a:solidFill>
+                <a:latin typeface="Source Sans Pro Light"/>
+                <a:ea typeface="Source Sans Pro Light"/>
+              </a:rPr>
+              <a:t>PBC</a:t>
+            </a:r>
+            <a:r>
+              <a:rPr lang="en-US" sz="900" b="0" strike="noStrike" spc="-1" dirty="0" smtClean="0">
+                <a:solidFill>
+                  <a:srgbClr val="000000"/>
+                </a:solidFill>
+                <a:latin typeface="Source Sans Pro Light"/>
+                <a:ea typeface="Source Sans Pro Light"/>
+              </a:rPr>
+              <a:t>  </a:t>
+            </a:r>
+            <a:r>
+              <a:rPr lang="en-US" sz="900" b="0" strike="noStrike" spc="-1" dirty="0">
+                <a:solidFill>
+                  <a:srgbClr val="000000"/>
+                </a:solidFill>
+                <a:latin typeface="Source Sans Pro Light"/>
+                <a:ea typeface="Source Sans Pro Light"/>
+              </a:rPr>
+              <a:t>•  </a:t>
             </a:r>
             <a:r>
               <a:rPr lang="en-US" sz="900" b="0" u="sng" strike="noStrike" spc="-1" dirty="0">
@@ -14735,7 +14765,7 @@
               <a:t>® is a trademark of </a:t>
             </a:r>
             <a:r>
-              <a:rPr lang="en-US" sz="900" b="0" strike="noStrike" spc="-1" dirty="0" err="1">
+              <a:rPr lang="en-US" sz="900" b="0" strike="noStrike" spc="-1" dirty="0" err="1" smtClean="0">
                 <a:solidFill>
                   <a:srgbClr val="000000"/>
                 </a:solidFill>
@@ -14745,14 +14775,24 @@
               <a:t>RStudio</a:t>
             </a:r>
             <a:r>
-              <a:rPr lang="en-US" sz="900" b="0" strike="noStrike" spc="-1" dirty="0">
+              <a:rPr lang="en-US" sz="900" b="0" strike="noStrike" spc="-1" smtClean="0">
                 <a:solidFill>
                   <a:srgbClr val="000000"/>
                 </a:solidFill>
                 <a:latin typeface="Source Sans Pro Light"/>
                 <a:ea typeface="Source Sans Pro Light"/>
               </a:rPr>
-              <a:t>, Inc.  •  </a:t>
+              <a:t>, PBC  </a:t>
+            </a:r>
+            <a:r>
+              <a:rPr lang="en-US" sz="900" b="0" strike="noStrike" spc="-1" dirty="0">
+                <a:solidFill>
+                  <a:srgbClr val="000000"/>
+                </a:solidFill>
+                <a:latin typeface="Source Sans Pro Light"/>
+                <a:ea typeface="Source Sans Pro Light"/>
+              </a:rPr>
+              <a:t>•  </a:t>
             </a:r>
             <a:r>
               <a:rPr lang="en-US" sz="900" b="0" u="sng" strike="noStrike" spc="-1" dirty="0">

</xml_diff>

<commit_message>
Use broom::tidy() for logistic regression confints
</commit_message>
<xml_diff>
--- a/mosaic-cheatsheet-gf.pptx
+++ b/mosaic-cheatsheet-gf.pptx
@@ -3015,24 +3015,14 @@
               <a:t> &amp; DT Kaplan •  Updated: </a:t>
             </a:r>
             <a:r>
-              <a:rPr lang="en-US" sz="900" spc="-1" dirty="0">
+              <a:rPr lang="en-US" sz="900" spc="-1" dirty="0" smtClean="0">
                 <a:solidFill>
                   <a:srgbClr val="000000"/>
                 </a:solidFill>
                 <a:latin typeface="Source Sans Pro Light"/>
                 <a:ea typeface="Source Sans Pro Light"/>
               </a:rPr>
-              <a:t>08/</a:t>
-            </a:r>
-            <a:r>
-              <a:rPr lang="en-US" sz="900" b="0" strike="noStrike" spc="-1" dirty="0">
-                <a:solidFill>
-                  <a:srgbClr val="000000"/>
-                </a:solidFill>
-                <a:latin typeface="Source Sans Pro Light"/>
-                <a:ea typeface="Source Sans Pro Light"/>
-              </a:rPr>
-              <a:t>18</a:t>
+              <a:t>06/20</a:t>
             </a:r>
             <a:endParaRPr lang="en-US" sz="900" b="0" strike="noStrike" spc="-1" dirty="0">
               <a:latin typeface="Arial"/>
@@ -6926,11 +6916,6 @@
             </a:endParaRPr>
           </a:p>
           <a:p>
-            <a:pPr>
-              <a:lnSpc>
-                <a:spcPct val="120000"/>
-              </a:lnSpc>
-            </a:pPr>
             <a:r>
               <a:rPr lang="en-US" sz="1200" b="1" strike="noStrike" spc="-1" dirty="0">
                 <a:solidFill>
@@ -10636,7 +10621,7 @@
         <p:spPr>
           <a:xfrm>
             <a:off x="6902412" y="710049"/>
-            <a:ext cx="3108960" cy="7014726"/>
+            <a:ext cx="3108960" cy="6821051"/>
           </a:xfrm>
           <a:prstGeom prst="rect">
             <a:avLst/>
@@ -10671,118 +10656,21 @@
               <a:lnSpc>
                 <a:spcPct val="150000"/>
               </a:lnSpc>
-            </a:pPr>
-            <a:r>
-              <a:rPr lang="en-US" sz="1200" b="0" strike="noStrike" spc="-1" dirty="0">
-                <a:solidFill>
-                  <a:srgbClr val="000000"/>
-                </a:solidFill>
-                <a:latin typeface="Arial"/>
-                <a:ea typeface="DejaVu Sans"/>
-              </a:rPr>
-              <a:t>Correlation coefficient</a:t>
-            </a:r>
-            <a:endParaRPr lang="en-US" sz="1200" b="0" strike="noStrike" spc="-1" dirty="0">
-              <a:latin typeface="Arial"/>
-            </a:endParaRPr>
-          </a:p>
-          <a:p>
-            <a:pPr>
-              <a:lnSpc>
-                <a:spcPct val="100000"/>
-              </a:lnSpc>
-            </a:pPr>
-            <a:r>
-              <a:rPr lang="en-US" sz="1200" b="1" strike="noStrike" spc="-1" dirty="0" err="1">
-                <a:solidFill>
-                  <a:srgbClr val="000000"/>
-                </a:solidFill>
-                <a:latin typeface="Courier New"/>
-                <a:ea typeface="DejaVu Sans"/>
-              </a:rPr>
-              <a:t>cor</a:t>
-            </a:r>
-            <a:r>
-              <a:rPr lang="en-US" sz="1200" b="1" strike="noStrike" spc="-1" dirty="0">
-                <a:solidFill>
-                  <a:srgbClr val="000000"/>
-                </a:solidFill>
-                <a:latin typeface="Courier New"/>
-                <a:ea typeface="DejaVu Sans"/>
-              </a:rPr>
-              <a:t>(</a:t>
-            </a:r>
-            <a:r>
-              <a:rPr lang="en-US" sz="1200" b="1" strike="noStrike" spc="-1" dirty="0" err="1">
-                <a:solidFill>
-                  <a:srgbClr val="000000"/>
-                </a:solidFill>
-                <a:latin typeface="Courier New"/>
-                <a:ea typeface="DejaVu Sans"/>
-              </a:rPr>
-              <a:t>cesd</a:t>
-            </a:r>
-            <a:r>
-              <a:rPr lang="en-US" sz="1200" b="1" strike="noStrike" spc="-1" dirty="0">
-                <a:solidFill>
-                  <a:srgbClr val="000000"/>
-                </a:solidFill>
-                <a:latin typeface="Courier New"/>
-                <a:ea typeface="DejaVu Sans"/>
-              </a:rPr>
-              <a:t> ~ </a:t>
-            </a:r>
-            <a:r>
-              <a:rPr lang="en-US" sz="1200" b="1" strike="noStrike" spc="-1" dirty="0" err="1">
-                <a:solidFill>
-                  <a:srgbClr val="000000"/>
-                </a:solidFill>
-                <a:latin typeface="Courier New"/>
-                <a:ea typeface="DejaVu Sans"/>
-              </a:rPr>
-              <a:t>mcs</a:t>
-            </a:r>
-            <a:r>
-              <a:rPr lang="en-US" sz="1200" b="1" strike="noStrike" spc="-1" dirty="0">
-                <a:solidFill>
-                  <a:srgbClr val="000000"/>
-                </a:solidFill>
-                <a:latin typeface="Courier New"/>
-                <a:ea typeface="DejaVu Sans"/>
-              </a:rPr>
-              <a:t>, data = </a:t>
-            </a:r>
-            <a:r>
-              <a:rPr lang="en-US" sz="1200" b="1" strike="noStrike" spc="-1" dirty="0" err="1">
-                <a:solidFill>
-                  <a:srgbClr val="000000"/>
-                </a:solidFill>
-                <a:latin typeface="Courier New"/>
-                <a:ea typeface="DejaVu Sans"/>
-              </a:rPr>
-              <a:t>HELPrct</a:t>
-            </a:r>
-            <a:r>
-              <a:rPr lang="en-US" sz="1200" b="1" strike="noStrike" spc="-1" dirty="0">
-                <a:solidFill>
-                  <a:srgbClr val="000000"/>
-                </a:solidFill>
-                <a:latin typeface="Courier New"/>
-                <a:ea typeface="DejaVu Sans"/>
-              </a:rPr>
-              <a:t>)</a:t>
-            </a:r>
-            <a:endParaRPr lang="en-US" sz="1200" b="0" strike="noStrike" spc="-1" dirty="0">
-              <a:latin typeface="Arial"/>
-            </a:endParaRPr>
-          </a:p>
-          <a:p>
-            <a:pPr>
               <a:spcBef>
                 <a:spcPts val="600"/>
               </a:spcBef>
             </a:pPr>
             <a:r>
+              <a:rPr lang="en-US" sz="1200" b="0" strike="noStrike" spc="-1" dirty="0" smtClean="0">
+                <a:solidFill>
+                  <a:srgbClr val="000000"/>
+                </a:solidFill>
+                <a:latin typeface="Arial"/>
+                <a:ea typeface="DejaVu Sans"/>
+              </a:rPr>
+              <a:t>Correlation </a:t>
+            </a:r>
+            <a:r>
               <a:rPr lang="en-US" sz="1200" b="0" strike="noStrike" spc="-1" dirty="0">
                 <a:solidFill>
                   <a:srgbClr val="000000"/>
@@ -10790,7 +10678,92 @@
                 <a:latin typeface="Arial"/>
                 <a:ea typeface="DejaVu Sans"/>
               </a:rPr>
-              <a:t>Scatterplot with </a:t>
+              <a:t>coefficient</a:t>
+            </a:r>
+            <a:endParaRPr lang="en-US" sz="1200" b="0" strike="noStrike" spc="-1" dirty="0">
+              <a:latin typeface="Arial"/>
+            </a:endParaRPr>
+          </a:p>
+          <a:p>
+            <a:r>
+              <a:rPr lang="en-US" sz="1200" b="1" strike="noStrike" spc="-1" dirty="0">
+                <a:solidFill>
+                  <a:srgbClr val="000000"/>
+                </a:solidFill>
+                <a:latin typeface="Courier New"/>
+                <a:ea typeface="DejaVu Sans"/>
+              </a:rPr>
+              <a:t>cor(</a:t>
+            </a:r>
+            <a:r>
+              <a:rPr lang="en-US" sz="1200" b="1" strike="noStrike" spc="-1" dirty="0" err="1">
+                <a:solidFill>
+                  <a:srgbClr val="000000"/>
+                </a:solidFill>
+                <a:latin typeface="Courier New"/>
+                <a:ea typeface="DejaVu Sans"/>
+              </a:rPr>
+              <a:t>cesd</a:t>
+            </a:r>
+            <a:r>
+              <a:rPr lang="en-US" sz="1200" b="1" strike="noStrike" spc="-1" dirty="0">
+                <a:solidFill>
+                  <a:srgbClr val="000000"/>
+                </a:solidFill>
+                <a:latin typeface="Courier New"/>
+                <a:ea typeface="DejaVu Sans"/>
+              </a:rPr>
+              <a:t> ~ mcs, data = </a:t>
+            </a:r>
+            <a:r>
+              <a:rPr lang="en-US" sz="1200" b="1" strike="noStrike" spc="-1" dirty="0" err="1" smtClean="0">
+                <a:solidFill>
+                  <a:srgbClr val="000000"/>
+                </a:solidFill>
+                <a:latin typeface="Courier New"/>
+                <a:ea typeface="DejaVu Sans"/>
+              </a:rPr>
+              <a:t>HELPrct</a:t>
+            </a:r>
+            <a:r>
+              <a:rPr lang="en-US" sz="1200" b="1" strike="noStrike" spc="-1" dirty="0" smtClean="0">
+                <a:solidFill>
+                  <a:srgbClr val="000000"/>
+                </a:solidFill>
+                <a:latin typeface="Courier New"/>
+                <a:ea typeface="DejaVu Sans"/>
+              </a:rPr>
+              <a:t>)</a:t>
+            </a:r>
+            <a:endParaRPr lang="en-US" sz="1200" spc="-1" dirty="0">
+              <a:latin typeface="Arial"/>
+            </a:endParaRPr>
+          </a:p>
+          <a:p>
+            <a:pPr>
+              <a:spcBef>
+                <a:spcPts val="600"/>
+              </a:spcBef>
+            </a:pPr>
+            <a:r>
+              <a:rPr lang="en-US" sz="1200" b="0" strike="noStrike" spc="-1" dirty="0" smtClean="0">
+                <a:solidFill>
+                  <a:srgbClr val="000000"/>
+                </a:solidFill>
+                <a:latin typeface="Arial"/>
+                <a:ea typeface="DejaVu Sans"/>
+              </a:rPr>
+              <a:t>Scatterplot </a:t>
+            </a:r>
+            <a:r>
+              <a:rPr lang="en-US" sz="1200" b="0" strike="noStrike" spc="-1" dirty="0">
+                <a:solidFill>
+                  <a:srgbClr val="000000"/>
+                </a:solidFill>
+                <a:latin typeface="Arial"/>
+                <a:ea typeface="DejaVu Sans"/>
+              </a:rPr>
+              <a:t>with </a:t>
             </a:r>
             <a:r>
               <a:rPr lang="en-US" sz="1200" spc="-1" dirty="0">
@@ -10823,13 +10796,22 @@
               </a:lnSpc>
             </a:pPr>
             <a:r>
+              <a:rPr lang="en-US" sz="1100" b="1" spc="-1" dirty="0">
+                <a:solidFill>
+                  <a:srgbClr val="000000"/>
+                </a:solidFill>
+                <a:latin typeface="Courier New"/>
+              </a:rPr>
+              <a:t>gf_point(</a:t>
+            </a:r>
+            <a:r>
               <a:rPr lang="en-US" sz="1100" b="1" spc="-1" dirty="0" err="1">
                 <a:solidFill>
                   <a:srgbClr val="000000"/>
                 </a:solidFill>
                 <a:latin typeface="Courier New"/>
               </a:rPr>
-              <a:t>gf_point</a:t>
+              <a:t>cesd</a:t>
             </a:r>
             <a:r>
               <a:rPr lang="en-US" sz="1100" b="1" spc="-1" dirty="0">
@@ -10838,7 +10820,23 @@
                 </a:solidFill>
                 <a:latin typeface="Courier New"/>
               </a:rPr>
-              <a:t>(</a:t>
+              <a:t> ~ mcs, </a:t>
+            </a:r>
+          </a:p>
+          <a:p>
+            <a:pPr>
+              <a:lnSpc>
+                <a:spcPct val="100000"/>
+              </a:lnSpc>
+            </a:pPr>
+            <a:r>
+              <a:rPr lang="en-US" sz="1100" b="1" spc="-1" dirty="0">
+                <a:solidFill>
+                  <a:srgbClr val="000000"/>
+                </a:solidFill>
+                <a:latin typeface="Courier New"/>
+              </a:rPr>
+              <a:t>         data = </a:t>
             </a:r>
             <a:r>
               <a:rPr lang="en-US" sz="1100" b="1" spc="-1" dirty="0" err="1">
@@ -10847,7 +10845,7 @@
                 </a:solidFill>
                 <a:latin typeface="Courier New"/>
               </a:rPr>
-              <a:t>cesd</a:t>
+              <a:t>HELPrct</a:t>
             </a:r>
             <a:r>
               <a:rPr lang="en-US" sz="1100" b="1" spc="-1" dirty="0">
@@ -10856,7 +10854,18 @@
                 </a:solidFill>
                 <a:latin typeface="Courier New"/>
               </a:rPr>
-              <a:t> ~ </a:t>
+              <a:t>) %&gt;% </a:t>
+            </a:r>
+          </a:p>
+          <a:p>
+            <a:r>
+              <a:rPr lang="en-US" sz="1100" b="1" spc="-1" dirty="0">
+                <a:solidFill>
+                  <a:srgbClr val="000000"/>
+                </a:solidFill>
+                <a:latin typeface="Courier New"/>
+              </a:rPr>
+              <a:t>  </a:t>
             </a:r>
             <a:r>
               <a:rPr lang="en-US" sz="1100" b="1" spc="-1" dirty="0" err="1">
@@ -10865,7 +10874,7 @@
                 </a:solidFill>
                 <a:latin typeface="Courier New"/>
               </a:rPr>
-              <a:t>mcs</a:t>
+              <a:t>gf_lm</a:t>
             </a:r>
             <a:r>
               <a:rPr lang="en-US" sz="1100" b="1" spc="-1" dirty="0">
@@ -10874,15 +10883,17 @@
                 </a:solidFill>
                 <a:latin typeface="Courier New"/>
               </a:rPr>
-              <a:t>, </a:t>
-            </a:r>
-          </a:p>
-          <a:p>
-            <a:pPr>
-              <a:lnSpc>
-                <a:spcPct val="100000"/>
-              </a:lnSpc>
-            </a:pPr>
+              <a:t>(size = 1.5, </a:t>
+            </a:r>
+            <a:r>
+              <a:rPr lang="en-US" sz="1100" b="1" spc="-1" dirty="0" err="1">
+                <a:solidFill>
+                  <a:srgbClr val="000000"/>
+                </a:solidFill>
+                <a:latin typeface="Courier New"/>
+              </a:rPr>
+              <a:t>linetype</a:t>
+            </a:r>
             <a:r>
               <a:rPr lang="en-US" sz="1100" b="1" spc="-1" dirty="0">
                 <a:solidFill>
@@ -10890,17 +10901,19 @@
                 </a:solidFill>
                 <a:latin typeface="Courier New"/>
               </a:rPr>
-              <a:t>         data = </a:t>
-            </a:r>
-            <a:r>
-              <a:rPr lang="en-US" sz="1100" b="1" spc="-1" dirty="0" err="1">
-                <a:solidFill>
-                  <a:srgbClr val="000000"/>
-                </a:solidFill>
-                <a:latin typeface="Courier New"/>
-              </a:rPr>
-              <a:t>HELPrct</a:t>
-            </a:r>
+              <a:t> = </a:t>
+            </a:r>
+            <a:r>
+              <a:rPr lang="en-US" sz="1100" b="1" spc="-1" dirty="0" smtClean="0">
+                <a:solidFill>
+                  <a:srgbClr val="000000"/>
+                </a:solidFill>
+                <a:latin typeface="Courier New"/>
+              </a:rPr>
+              <a:t>    </a:t>
+            </a:r>
+          </a:p>
+          <a:p>
             <a:r>
               <a:rPr lang="en-US" sz="1100" b="1" spc="-1" dirty="0">
                 <a:solidFill>
@@ -10908,10 +10921,17 @@
                 </a:solidFill>
                 <a:latin typeface="Courier New"/>
               </a:rPr>
-              <a:t>) %&gt;% </a:t>
-            </a:r>
-          </a:p>
-          <a:p>
+              <a:t> </a:t>
+            </a:r>
+            <a:r>
+              <a:rPr lang="en-US" sz="1100" b="1" spc="-1" dirty="0" smtClean="0">
+                <a:solidFill>
+                  <a:srgbClr val="000000"/>
+                </a:solidFill>
+                <a:latin typeface="Courier New"/>
+              </a:rPr>
+              <a:t>   "</a:t>
+            </a:r>
             <a:r>
               <a:rPr lang="en-US" sz="1100" b="1" spc="-1" dirty="0">
                 <a:solidFill>
@@ -10919,75 +10939,10 @@
                 </a:solidFill>
                 <a:latin typeface="Courier New"/>
               </a:rPr>
-              <a:t>  </a:t>
-            </a:r>
-            <a:r>
-              <a:rPr lang="en-US" sz="1100" b="1" spc="-1" dirty="0" err="1">
-                <a:solidFill>
-                  <a:srgbClr val="000000"/>
-                </a:solidFill>
-                <a:latin typeface="Courier New"/>
-              </a:rPr>
-              <a:t>gf_lm</a:t>
-            </a:r>
-            <a:r>
-              <a:rPr lang="en-US" sz="1100" b="1" spc="-1" dirty="0">
-                <a:solidFill>
-                  <a:srgbClr val="000000"/>
-                </a:solidFill>
-                <a:latin typeface="Courier New"/>
-              </a:rPr>
-              <a:t>(size </a:t>
-            </a:r>
-            <a:r>
-              <a:rPr lang="en-US" sz="1100" b="1" spc="-1">
-                <a:solidFill>
-                  <a:srgbClr val="000000"/>
-                </a:solidFill>
-                <a:latin typeface="Courier New"/>
-              </a:rPr>
-              <a:t>= 1.5, linetype = </a:t>
-            </a:r>
-            <a:r>
-              <a:rPr lang="en-US" sz="1100" b="1" spc="-1" smtClean="0">
-                <a:solidFill>
-                  <a:srgbClr val="000000"/>
-                </a:solidFill>
-                <a:latin typeface="Courier New"/>
-              </a:rPr>
-              <a:t>    </a:t>
-            </a:r>
-          </a:p>
-          <a:p>
-            <a:r>
-              <a:rPr lang="en-US" sz="1100" b="1" spc="-1">
-                <a:solidFill>
-                  <a:srgbClr val="000000"/>
-                </a:solidFill>
-                <a:latin typeface="Courier New"/>
-              </a:rPr>
-              <a:t> </a:t>
-            </a:r>
-            <a:r>
-              <a:rPr lang="en-US" sz="1100" b="1" spc="-1" smtClean="0">
-                <a:solidFill>
-                  <a:srgbClr val="000000"/>
-                </a:solidFill>
-                <a:latin typeface="Courier New"/>
-              </a:rPr>
-              <a:t>   "</a:t>
-            </a:r>
-            <a:r>
-              <a:rPr lang="en-US" sz="1100" b="1" spc="-1">
-                <a:solidFill>
-                  <a:srgbClr val="000000"/>
-                </a:solidFill>
-                <a:latin typeface="Courier New"/>
-              </a:rPr>
               <a:t>dashed</a:t>
             </a:r>
             <a:r>
-              <a:rPr lang="en-US" sz="1100" b="1" spc="-1" smtClean="0">
+              <a:rPr lang="en-US" sz="1100" b="1" spc="-1" dirty="0" smtClean="0">
                 <a:solidFill>
                   <a:srgbClr val="000000"/>
                 </a:solidFill>
@@ -11017,7 +10972,7 @@
               </a:lnSpc>
             </a:pPr>
             <a:r>
-              <a:rPr lang="en-US" sz="1100" b="1" spc="-1">
+              <a:rPr lang="en-US" sz="1100" b="1" spc="-1" dirty="0">
                 <a:solidFill>
                   <a:srgbClr val="000000"/>
                 </a:solidFill>
@@ -11026,13 +10981,22 @@
               <a:t>  </a:t>
             </a:r>
             <a:r>
-              <a:rPr lang="en-US" sz="1100" b="1" spc="-1" smtClean="0">
-                <a:solidFill>
-                  <a:srgbClr val="000000"/>
-                </a:solidFill>
-                <a:latin typeface="Courier New"/>
-              </a:rPr>
-              <a:t>gf_smooth(color </a:t>
+              <a:rPr lang="en-US" sz="1100" b="1" spc="-1" dirty="0" err="1" smtClean="0">
+                <a:solidFill>
+                  <a:srgbClr val="000000"/>
+                </a:solidFill>
+                <a:latin typeface="Courier New"/>
+              </a:rPr>
+              <a:t>gf_smooth</a:t>
+            </a:r>
+            <a:r>
+              <a:rPr lang="en-US" sz="1100" b="1" spc="-1" dirty="0" smtClean="0">
+                <a:solidFill>
+                  <a:srgbClr val="000000"/>
+                </a:solidFill>
+                <a:latin typeface="Courier New"/>
+              </a:rPr>
+              <a:t>(color </a:t>
             </a:r>
             <a:r>
               <a:rPr lang="en-US" sz="1100" b="1" spc="-1" dirty="0">
@@ -11041,23 +11005,8 @@
                 </a:solidFill>
                 <a:latin typeface="Courier New"/>
               </a:rPr>
-              <a:t>= "red</a:t>
-            </a:r>
-            <a:r>
-              <a:rPr lang="en-US" sz="1100" b="1" spc="-1">
-                <a:solidFill>
-                  <a:srgbClr val="000000"/>
-                </a:solidFill>
-                <a:latin typeface="Courier New"/>
-              </a:rPr>
-              <a:t>") </a:t>
-            </a:r>
-            <a:endParaRPr lang="en-US" sz="1100" b="1" spc="-1" dirty="0">
-              <a:solidFill>
-                <a:srgbClr val="000000"/>
-              </a:solidFill>
-              <a:latin typeface="Courier New"/>
-            </a:endParaRPr>
+              <a:t>= "red") </a:t>
+            </a:r>
           </a:p>
           <a:p>
             <a:pPr>
@@ -11144,7 +11093,7 @@
                 <a:spcPts val="600"/>
               </a:spcBef>
             </a:pPr>
-            <a:endParaRPr lang="en-US" sz="1200" spc="-1">
+            <a:endParaRPr lang="en-US" sz="1200" spc="-1" dirty="0">
               <a:solidFill>
                 <a:srgbClr val="000000"/>
               </a:solidFill>
@@ -11159,7 +11108,7 @@
               </a:spcBef>
             </a:pPr>
             <a:r>
-              <a:rPr lang="en-US" sz="1200" b="0" strike="noStrike" spc="-1" smtClean="0">
+              <a:rPr lang="en-US" sz="1200" b="0" strike="noStrike" spc="-1" dirty="0" smtClean="0">
                 <a:solidFill>
                   <a:srgbClr val="000000"/>
                 </a:solidFill>
@@ -11196,7 +11145,7 @@
                 <a:latin typeface="Courier New"/>
                 <a:ea typeface="DejaVu Sans"/>
               </a:rPr>
-              <a:t>cesdmodel &lt;- </a:t>
+              <a:t>cesdmodel &lt;- lm(</a:t>
             </a:r>
             <a:r>
               <a:rPr lang="en-US" sz="1200" b="1" strike="noStrike" spc="-1" dirty="0" err="1">
@@ -11206,7 +11155,7 @@
                 <a:latin typeface="Courier New"/>
                 <a:ea typeface="DejaVu Sans"/>
               </a:rPr>
-              <a:t>lm</a:t>
+              <a:t>cesd</a:t>
             </a:r>
             <a:r>
               <a:rPr lang="en-US" sz="1200" b="1" strike="noStrike" spc="-1" dirty="0">
@@ -11216,6 +11165,196 @@
                 <a:latin typeface="Courier New"/>
                 <a:ea typeface="DejaVu Sans"/>
               </a:rPr>
+              <a:t> ~ mcs, </a:t>
+            </a:r>
+            <a:endParaRPr lang="en-US" sz="1200" b="0" strike="noStrike" spc="-1" dirty="0">
+              <a:latin typeface="Arial"/>
+            </a:endParaRPr>
+          </a:p>
+          <a:p>
+            <a:pPr>
+              <a:lnSpc>
+                <a:spcPct val="100000"/>
+              </a:lnSpc>
+            </a:pPr>
+            <a:r>
+              <a:rPr lang="en-US" sz="1200" b="1" strike="noStrike" spc="-1" dirty="0">
+                <a:solidFill>
+                  <a:srgbClr val="000000"/>
+                </a:solidFill>
+                <a:latin typeface="Courier New"/>
+                <a:ea typeface="DejaVu Sans"/>
+              </a:rPr>
+              <a:t>  data = </a:t>
+            </a:r>
+            <a:r>
+              <a:rPr lang="en-US" sz="1200" b="1" strike="noStrike" spc="-1" dirty="0" err="1">
+                <a:solidFill>
+                  <a:srgbClr val="000000"/>
+                </a:solidFill>
+                <a:latin typeface="Courier New"/>
+                <a:ea typeface="DejaVu Sans"/>
+              </a:rPr>
+              <a:t>HELPrct</a:t>
+            </a:r>
+            <a:r>
+              <a:rPr lang="en-US" sz="1200" b="1" strike="noStrike" spc="-1" dirty="0">
+                <a:solidFill>
+                  <a:srgbClr val="000000"/>
+                </a:solidFill>
+                <a:latin typeface="Courier New"/>
+                <a:ea typeface="DejaVu Sans"/>
+              </a:rPr>
+              <a:t>)</a:t>
+            </a:r>
+            <a:endParaRPr lang="en-US" sz="1200" b="0" strike="noStrike" spc="-1" dirty="0">
+              <a:latin typeface="Arial"/>
+            </a:endParaRPr>
+          </a:p>
+          <a:p>
+            <a:pPr>
+              <a:lnSpc>
+                <a:spcPct val="100000"/>
+              </a:lnSpc>
+            </a:pPr>
+            <a:r>
+              <a:rPr lang="en-US" sz="1200" b="1" strike="noStrike" spc="-1" dirty="0" err="1">
+                <a:solidFill>
+                  <a:srgbClr val="000000"/>
+                </a:solidFill>
+                <a:latin typeface="Courier New"/>
+                <a:ea typeface="DejaVu Sans"/>
+              </a:rPr>
+              <a:t>msummary</a:t>
+            </a:r>
+            <a:r>
+              <a:rPr lang="en-US" sz="1200" b="1" strike="noStrike" spc="-1" dirty="0">
+                <a:solidFill>
+                  <a:srgbClr val="000000"/>
+                </a:solidFill>
+                <a:latin typeface="Courier New"/>
+                <a:ea typeface="DejaVu Sans"/>
+              </a:rPr>
+              <a:t>(cesdmodel)</a:t>
+            </a:r>
+            <a:endParaRPr lang="en-US" sz="1200" b="0" strike="noStrike" spc="-1" dirty="0">
+              <a:latin typeface="Arial"/>
+            </a:endParaRPr>
+          </a:p>
+          <a:p>
+            <a:pPr>
+              <a:lnSpc>
+                <a:spcPct val="150000"/>
+              </a:lnSpc>
+            </a:pPr>
+            <a:r>
+              <a:rPr lang="en-US" sz="1200" b="0" strike="noStrike" spc="-1" dirty="0">
+                <a:solidFill>
+                  <a:srgbClr val="000000"/>
+                </a:solidFill>
+                <a:latin typeface="Arial"/>
+                <a:ea typeface="DejaVu Sans"/>
+              </a:rPr>
+              <a:t>Prediction</a:t>
+            </a:r>
+            <a:endParaRPr lang="en-US" sz="1200" b="0" strike="noStrike" spc="-1" dirty="0">
+              <a:latin typeface="Arial"/>
+            </a:endParaRPr>
+          </a:p>
+          <a:p>
+            <a:pPr>
+              <a:lnSpc>
+                <a:spcPct val="100000"/>
+              </a:lnSpc>
+            </a:pPr>
+            <a:r>
+              <a:rPr lang="en-US" sz="1200" b="1" spc="-1" dirty="0" err="1">
+                <a:solidFill>
+                  <a:srgbClr val="000000"/>
+                </a:solidFill>
+                <a:latin typeface="Courier New"/>
+                <a:ea typeface="DejaVu Sans"/>
+              </a:rPr>
+              <a:t>l</a:t>
+            </a:r>
+            <a:r>
+              <a:rPr lang="en-US" sz="1200" b="1" strike="noStrike" spc="-1" dirty="0" err="1">
+                <a:solidFill>
+                  <a:srgbClr val="000000"/>
+                </a:solidFill>
+                <a:latin typeface="Courier New"/>
+                <a:ea typeface="DejaVu Sans"/>
+              </a:rPr>
+              <a:t>m_fun</a:t>
+            </a:r>
+            <a:r>
+              <a:rPr lang="en-US" sz="1200" b="1" strike="noStrike" spc="-1" dirty="0">
+                <a:solidFill>
+                  <a:srgbClr val="000000"/>
+                </a:solidFill>
+                <a:latin typeface="Courier New"/>
+                <a:ea typeface="DejaVu Sans"/>
+              </a:rPr>
+              <a:t> &lt;- </a:t>
+            </a:r>
+            <a:r>
+              <a:rPr lang="en-US" sz="1200" b="1" strike="noStrike" spc="-1" dirty="0" err="1">
+                <a:solidFill>
+                  <a:srgbClr val="000000"/>
+                </a:solidFill>
+                <a:latin typeface="Courier New"/>
+                <a:ea typeface="DejaVu Sans"/>
+              </a:rPr>
+              <a:t>makeFun</a:t>
+            </a:r>
+            <a:r>
+              <a:rPr lang="en-US" sz="1200" b="1" strike="noStrike" spc="-1" dirty="0">
+                <a:solidFill>
+                  <a:srgbClr val="000000"/>
+                </a:solidFill>
+                <a:latin typeface="Courier New"/>
+                <a:ea typeface="DejaVu Sans"/>
+              </a:rPr>
+              <a:t>(cesdmodel)</a:t>
+            </a:r>
+            <a:endParaRPr lang="en-US" sz="1200" b="0" strike="noStrike" spc="-1" dirty="0">
+              <a:latin typeface="Arial"/>
+            </a:endParaRPr>
+          </a:p>
+          <a:p>
+            <a:pPr>
+              <a:lnSpc>
+                <a:spcPct val="100000"/>
+              </a:lnSpc>
+            </a:pPr>
+            <a:r>
+              <a:rPr lang="en-US" sz="1200" b="1" spc="-1" dirty="0" err="1">
+                <a:solidFill>
+                  <a:srgbClr val="000000"/>
+                </a:solidFill>
+                <a:latin typeface="Courier New"/>
+                <a:ea typeface="DejaVu Sans"/>
+              </a:rPr>
+              <a:t>l</a:t>
+            </a:r>
+            <a:r>
+              <a:rPr lang="en-US" sz="1200" b="1" strike="noStrike" spc="-1" dirty="0" err="1">
+                <a:solidFill>
+                  <a:srgbClr val="000000"/>
+                </a:solidFill>
+                <a:latin typeface="Courier New"/>
+                <a:ea typeface="DejaVu Sans"/>
+              </a:rPr>
+              <a:t>m_fun</a:t>
+            </a:r>
+            <a:r>
+              <a:rPr lang="en-US" sz="1200" b="1" strike="noStrike" spc="-1" dirty="0">
+                <a:solidFill>
+                  <a:srgbClr val="000000"/>
+                </a:solidFill>
+                <a:latin typeface="Courier New"/>
+                <a:ea typeface="DejaVu Sans"/>
+              </a:rPr>
               <a:t>(</a:t>
             </a:r>
             <a:r>
@@ -11226,7 +11365,7 @@
                 <a:latin typeface="Courier New"/>
                 <a:ea typeface="DejaVu Sans"/>
               </a:rPr>
-              <a:t>cesd</a:t>
+              <a:t>mcs</a:t>
             </a:r>
             <a:r>
               <a:rPr lang="en-US" sz="1200" b="1" strike="noStrike" spc="-1" dirty="0">
@@ -11236,8 +11375,38 @@
                 <a:latin typeface="Courier New"/>
                 <a:ea typeface="DejaVu Sans"/>
               </a:rPr>
-              <a:t> ~ </a:t>
-            </a:r>
+              <a:t> = 35)</a:t>
+            </a:r>
+            <a:endParaRPr lang="en-US" sz="1200" b="0" strike="noStrike" spc="-1" dirty="0">
+              <a:latin typeface="Arial"/>
+            </a:endParaRPr>
+          </a:p>
+          <a:p>
+            <a:pPr>
+              <a:lnSpc>
+                <a:spcPct val="150000"/>
+              </a:lnSpc>
+            </a:pPr>
+            <a:r>
+              <a:rPr lang="en-US" sz="1200" b="0" strike="noStrike" spc="-1" dirty="0">
+                <a:solidFill>
+                  <a:srgbClr val="000000"/>
+                </a:solidFill>
+                <a:latin typeface="Arial"/>
+                <a:ea typeface="DejaVu Sans"/>
+              </a:rPr>
+              <a:t>Extract useful quantities</a:t>
+            </a:r>
+            <a:endParaRPr lang="en-US" sz="1200" b="0" strike="noStrike" spc="-1" dirty="0">
+              <a:latin typeface="Arial"/>
+            </a:endParaRPr>
+          </a:p>
+          <a:p>
+            <a:pPr>
+              <a:lnSpc>
+                <a:spcPct val="100000"/>
+              </a:lnSpc>
+            </a:pPr>
             <a:r>
               <a:rPr lang="en-US" sz="1200" b="1" strike="noStrike" spc="-1" dirty="0" err="1">
                 <a:solidFill>
@@ -11246,7 +11415,7 @@
                 <a:latin typeface="Courier New"/>
                 <a:ea typeface="DejaVu Sans"/>
               </a:rPr>
-              <a:t>mcs</a:t>
+              <a:t>anova</a:t>
             </a:r>
             <a:r>
               <a:rPr lang="en-US" sz="1200" b="1" strike="noStrike" spc="-1" dirty="0">
@@ -11256,7 +11425,7 @@
                 <a:latin typeface="Courier New"/>
                 <a:ea typeface="DejaVu Sans"/>
               </a:rPr>
-              <a:t>, </a:t>
+              <a:t>(cesdmodel)</a:t>
             </a:r>
             <a:endParaRPr lang="en-US" sz="1200" b="0" strike="noStrike" spc="-1" dirty="0">
               <a:latin typeface="Arial"/>
@@ -11269,6 +11438,16 @@
               </a:lnSpc>
             </a:pPr>
             <a:r>
+              <a:rPr lang="en-US" sz="1200" b="1" strike="noStrike" spc="-1" dirty="0" err="1">
+                <a:solidFill>
+                  <a:srgbClr val="000000"/>
+                </a:solidFill>
+                <a:latin typeface="Courier New"/>
+                <a:ea typeface="DejaVu Sans"/>
+              </a:rPr>
+              <a:t>coef</a:t>
+            </a:r>
+            <a:r>
               <a:rPr lang="en-US" sz="1200" b="1" strike="noStrike" spc="-1" dirty="0">
                 <a:solidFill>
                   <a:srgbClr val="000000"/>
@@ -11276,8 +11455,18 @@
                 <a:latin typeface="Courier New"/>
                 <a:ea typeface="DejaVu Sans"/>
               </a:rPr>
-              <a:t>  data = </a:t>
-            </a:r>
+              <a:t>(cesdmodel)</a:t>
+            </a:r>
+            <a:endParaRPr lang="en-US" sz="1200" b="0" strike="noStrike" spc="-1" dirty="0">
+              <a:latin typeface="Arial"/>
+            </a:endParaRPr>
+          </a:p>
+          <a:p>
+            <a:pPr>
+              <a:lnSpc>
+                <a:spcPct val="100000"/>
+              </a:lnSpc>
+            </a:pPr>
             <a:r>
               <a:rPr lang="en-US" sz="1200" b="1" strike="noStrike" spc="-1" dirty="0" err="1">
                 <a:solidFill>
@@ -11286,7 +11475,7 @@
                 <a:latin typeface="Courier New"/>
                 <a:ea typeface="DejaVu Sans"/>
               </a:rPr>
-              <a:t>HELPrct</a:t>
+              <a:t>confint</a:t>
             </a:r>
             <a:r>
               <a:rPr lang="en-US" sz="1200" b="1" strike="noStrike" spc="-1" dirty="0">
@@ -11296,7 +11485,7 @@
                 <a:latin typeface="Courier New"/>
                 <a:ea typeface="DejaVu Sans"/>
               </a:rPr>
-              <a:t>)</a:t>
+              <a:t>(cesdmodel)</a:t>
             </a:r>
             <a:endParaRPr lang="en-US" sz="1200" b="0" strike="noStrike" spc="-1" dirty="0">
               <a:latin typeface="Arial"/>
@@ -11316,7 +11505,7 @@
                 <a:latin typeface="Courier New"/>
                 <a:ea typeface="DejaVu Sans"/>
               </a:rPr>
-              <a:t>msummary</a:t>
+              <a:t>rsquared</a:t>
             </a:r>
             <a:r>
               <a:rPr lang="en-US" sz="1200" b="1" strike="noStrike" spc="-1" dirty="0">
@@ -11346,7 +11535,7 @@
                 <a:latin typeface="Arial"/>
                 <a:ea typeface="DejaVu Sans"/>
               </a:rPr>
-              <a:t>Prediction</a:t>
+              <a:t>Diagnostics; plot residuals</a:t>
             </a:r>
             <a:endParaRPr lang="en-US" sz="1200" b="0" strike="noStrike" spc="-1" dirty="0">
               <a:latin typeface="Arial"/>
@@ -11359,6 +11548,76 @@
               </a:lnSpc>
             </a:pPr>
             <a:r>
+              <a:rPr lang="en-US" sz="1200" b="1" strike="noStrike" spc="-1" dirty="0" err="1">
+                <a:solidFill>
+                  <a:srgbClr val="000000"/>
+                </a:solidFill>
+                <a:latin typeface="Courier New"/>
+                <a:ea typeface="DejaVu Sans"/>
+              </a:rPr>
+              <a:t>gf_dhistogram</a:t>
+            </a:r>
+            <a:r>
+              <a:rPr lang="en-US" sz="1200" b="1" strike="noStrike" spc="-1" dirty="0">
+                <a:solidFill>
+                  <a:srgbClr val="000000"/>
+                </a:solidFill>
+                <a:latin typeface="Courier New"/>
+                <a:ea typeface="DejaVu Sans"/>
+              </a:rPr>
+              <a:t>(~</a:t>
+            </a:r>
+            <a:r>
+              <a:rPr lang="en-US" sz="1200" b="1" strike="noStrike" spc="-1" dirty="0" err="1">
+                <a:solidFill>
+                  <a:srgbClr val="000000"/>
+                </a:solidFill>
+                <a:latin typeface="Courier New"/>
+                <a:ea typeface="DejaVu Sans"/>
+              </a:rPr>
+              <a:t>resid</a:t>
+            </a:r>
+            <a:r>
+              <a:rPr lang="en-US" sz="1200" b="1" strike="noStrike" spc="-1" dirty="0">
+                <a:solidFill>
+                  <a:srgbClr val="000000"/>
+                </a:solidFill>
+                <a:latin typeface="Courier New"/>
+                <a:ea typeface="DejaVu Sans"/>
+              </a:rPr>
+              <a:t>(</a:t>
+            </a:r>
+            <a:r>
+              <a:rPr lang="en-US" sz="1200" b="1" strike="noStrike" spc="-1" dirty="0" err="1">
+                <a:solidFill>
+                  <a:srgbClr val="000000"/>
+                </a:solidFill>
+                <a:latin typeface="Courier New"/>
+                <a:ea typeface="DejaVu Sans"/>
+              </a:rPr>
+              <a:t>cesdmodel</a:t>
+            </a:r>
+            <a:r>
+              <a:rPr lang="en-US" sz="1200" b="1" strike="noStrike" spc="-1" dirty="0">
+                <a:solidFill>
+                  <a:srgbClr val="000000"/>
+                </a:solidFill>
+                <a:latin typeface="Courier New"/>
+                <a:ea typeface="DejaVu Sans"/>
+              </a:rPr>
+              <a:t>))</a:t>
+            </a:r>
+            <a:endParaRPr lang="en-US" sz="1200" b="0" strike="noStrike" spc="-1" dirty="0">
+              <a:latin typeface="Arial"/>
+            </a:endParaRPr>
+          </a:p>
+          <a:p>
+            <a:pPr>
+              <a:lnSpc>
+                <a:spcPct val="100000"/>
+              </a:lnSpc>
+            </a:pPr>
+            <a:r>
               <a:rPr lang="en-US" sz="1200" b="1" spc="-1" dirty="0" err="1">
                 <a:solidFill>
                   <a:srgbClr val="000000"/>
@@ -11366,7 +11625,7 @@
                 <a:latin typeface="Courier New"/>
                 <a:ea typeface="DejaVu Sans"/>
               </a:rPr>
-              <a:t>l</a:t>
+              <a:t>g</a:t>
             </a:r>
             <a:r>
               <a:rPr lang="en-US" sz="1200" b="1" strike="noStrike" spc="-1" dirty="0" err="1">
@@ -11376,7 +11635,7 @@
                 <a:latin typeface="Courier New"/>
                 <a:ea typeface="DejaVu Sans"/>
               </a:rPr>
-              <a:t>m_fun</a:t>
+              <a:t>f_qq</a:t>
             </a:r>
             <a:r>
               <a:rPr lang="en-US" sz="1200" b="1" strike="noStrike" spc="-1" dirty="0">
@@ -11386,7 +11645,7 @@
                 <a:latin typeface="Courier New"/>
                 <a:ea typeface="DejaVu Sans"/>
               </a:rPr>
-              <a:t> &lt;- </a:t>
+              <a:t>(~</a:t>
             </a:r>
             <a:r>
               <a:rPr lang="en-US" sz="1200" b="1" strike="noStrike" spc="-1" dirty="0" err="1">
@@ -11396,7 +11655,7 @@
                 <a:latin typeface="Courier New"/>
                 <a:ea typeface="DejaVu Sans"/>
               </a:rPr>
-              <a:t>makeFun</a:t>
+              <a:t>resid</a:t>
             </a:r>
             <a:r>
               <a:rPr lang="en-US" sz="1200" b="1" strike="noStrike" spc="-1" dirty="0">
@@ -11406,7 +11665,7 @@
                 <a:latin typeface="Courier New"/>
                 <a:ea typeface="DejaVu Sans"/>
               </a:rPr>
-              <a:t>(cesdmodel)</a:t>
+              <a:t>(cesdmodel))</a:t>
             </a:r>
             <a:endParaRPr lang="en-US" sz="1200" b="0" strike="noStrike" spc="-1" dirty="0">
               <a:latin typeface="Arial"/>
@@ -11415,6 +11674,26 @@
           <a:p>
             <a:pPr>
               <a:lnSpc>
+                <a:spcPct val="150000"/>
+              </a:lnSpc>
+            </a:pPr>
+            <a:r>
+              <a:rPr lang="en-US" sz="1200" b="0" strike="noStrike" spc="-1" dirty="0">
+                <a:solidFill>
+                  <a:srgbClr val="000000"/>
+                </a:solidFill>
+                <a:latin typeface="Arial"/>
+                <a:ea typeface="DejaVu Sans"/>
+              </a:rPr>
+              <a:t>Diagnostics; plot residuals vs. fitted</a:t>
+            </a:r>
+            <a:endParaRPr lang="en-US" sz="1200" b="0" strike="noStrike" spc="-1" dirty="0">
+              <a:latin typeface="Arial"/>
+            </a:endParaRPr>
+          </a:p>
+          <a:p>
+            <a:pPr>
+              <a:lnSpc>
                 <a:spcPct val="100000"/>
               </a:lnSpc>
             </a:pPr>
@@ -11424,499 +11703,97 @@
                   <a:srgbClr val="000000"/>
                 </a:solidFill>
                 <a:latin typeface="Courier New"/>
-                <a:ea typeface="DejaVu Sans"/>
-              </a:rPr>
-              <a:t>l</a:t>
-            </a:r>
-            <a:r>
-              <a:rPr lang="en-US" sz="1200" b="1" strike="noStrike" spc="-1" dirty="0" err="1">
-                <a:solidFill>
-                  <a:srgbClr val="000000"/>
-                </a:solidFill>
-                <a:latin typeface="Courier New"/>
-                <a:ea typeface="DejaVu Sans"/>
-              </a:rPr>
-              <a:t>m_fun</a:t>
-            </a:r>
-            <a:r>
-              <a:rPr lang="en-US" sz="1200" b="1" strike="noStrike" spc="-1" dirty="0">
-                <a:solidFill>
-                  <a:srgbClr val="000000"/>
-                </a:solidFill>
-                <a:latin typeface="Courier New"/>
-                <a:ea typeface="DejaVu Sans"/>
+              </a:rPr>
+              <a:t>gf_point</a:t>
+            </a:r>
+            <a:r>
+              <a:rPr lang="en-US" sz="1200" b="1" spc="-1" dirty="0">
+                <a:solidFill>
+                  <a:srgbClr val="000000"/>
+                </a:solidFill>
+                <a:latin typeface="Courier New"/>
               </a:rPr>
               <a:t>(</a:t>
             </a:r>
             <a:r>
-              <a:rPr lang="en-US" sz="1200" b="1" strike="noStrike" spc="-1" dirty="0" err="1">
-                <a:solidFill>
-                  <a:srgbClr val="000000"/>
-                </a:solidFill>
-                <a:latin typeface="Courier New"/>
-                <a:ea typeface="DejaVu Sans"/>
-              </a:rPr>
-              <a:t>mcs</a:t>
-            </a:r>
-            <a:r>
-              <a:rPr lang="en-US" sz="1200" b="1" strike="noStrike" spc="-1" dirty="0">
-                <a:solidFill>
-                  <a:srgbClr val="000000"/>
-                </a:solidFill>
-                <a:latin typeface="Courier New"/>
-                <a:ea typeface="DejaVu Sans"/>
-              </a:rPr>
-              <a:t> = 35)</a:t>
-            </a:r>
-            <a:endParaRPr lang="en-US" sz="1200" b="0" strike="noStrike" spc="-1" dirty="0">
-              <a:latin typeface="Arial"/>
-            </a:endParaRPr>
-          </a:p>
-          <a:p>
-            <a:pPr>
-              <a:lnSpc>
-                <a:spcPct val="150000"/>
-              </a:lnSpc>
-            </a:pPr>
-            <a:r>
-              <a:rPr lang="en-US" sz="1200" b="0" strike="noStrike" spc="-1" dirty="0">
-                <a:solidFill>
-                  <a:srgbClr val="000000"/>
-                </a:solidFill>
-                <a:latin typeface="Arial"/>
-                <a:ea typeface="DejaVu Sans"/>
-              </a:rPr>
-              <a:t>Extract useful quantities</a:t>
-            </a:r>
-            <a:endParaRPr lang="en-US" sz="1200" b="0" strike="noStrike" spc="-1" dirty="0">
-              <a:latin typeface="Arial"/>
-            </a:endParaRPr>
-          </a:p>
-          <a:p>
-            <a:pPr>
-              <a:lnSpc>
-                <a:spcPct val="100000"/>
-              </a:lnSpc>
-            </a:pPr>
-            <a:r>
-              <a:rPr lang="en-US" sz="1200" b="1" strike="noStrike" spc="-1" dirty="0" err="1">
-                <a:solidFill>
-                  <a:srgbClr val="000000"/>
-                </a:solidFill>
-                <a:latin typeface="Courier New"/>
-                <a:ea typeface="DejaVu Sans"/>
-              </a:rPr>
-              <a:t>anova</a:t>
-            </a:r>
-            <a:r>
-              <a:rPr lang="en-US" sz="1200" b="1" strike="noStrike" spc="-1" dirty="0">
-                <a:solidFill>
-                  <a:srgbClr val="000000"/>
-                </a:solidFill>
-                <a:latin typeface="Courier New"/>
-                <a:ea typeface="DejaVu Sans"/>
-              </a:rPr>
-              <a:t>(cesdmodel)</a:t>
-            </a:r>
-            <a:endParaRPr lang="en-US" sz="1200" b="0" strike="noStrike" spc="-1" dirty="0">
-              <a:latin typeface="Arial"/>
-            </a:endParaRPr>
-          </a:p>
-          <a:p>
-            <a:pPr>
-              <a:lnSpc>
-                <a:spcPct val="100000"/>
-              </a:lnSpc>
-            </a:pPr>
-            <a:r>
-              <a:rPr lang="en-US" sz="1200" b="1" strike="noStrike" spc="-1" dirty="0" err="1">
-                <a:solidFill>
-                  <a:srgbClr val="000000"/>
-                </a:solidFill>
-                <a:latin typeface="Courier New"/>
-                <a:ea typeface="DejaVu Sans"/>
-              </a:rPr>
-              <a:t>coef</a:t>
-            </a:r>
-            <a:r>
-              <a:rPr lang="en-US" sz="1200" b="1" strike="noStrike" spc="-1" dirty="0">
-                <a:solidFill>
-                  <a:srgbClr val="000000"/>
-                </a:solidFill>
-                <a:latin typeface="Courier New"/>
-                <a:ea typeface="DejaVu Sans"/>
-              </a:rPr>
-              <a:t>(cesdmodel)</a:t>
-            </a:r>
-            <a:endParaRPr lang="en-US" sz="1200" b="0" strike="noStrike" spc="-1" dirty="0">
-              <a:latin typeface="Arial"/>
-            </a:endParaRPr>
-          </a:p>
-          <a:p>
-            <a:pPr>
-              <a:lnSpc>
-                <a:spcPct val="100000"/>
-              </a:lnSpc>
-            </a:pPr>
-            <a:r>
-              <a:rPr lang="en-US" sz="1200" b="1" strike="noStrike" spc="-1" dirty="0" err="1">
-                <a:solidFill>
-                  <a:srgbClr val="000000"/>
-                </a:solidFill>
-                <a:latin typeface="Courier New"/>
-                <a:ea typeface="DejaVu Sans"/>
-              </a:rPr>
-              <a:t>confint</a:t>
-            </a:r>
-            <a:r>
-              <a:rPr lang="en-US" sz="1200" b="1" strike="noStrike" spc="-1" dirty="0">
-                <a:solidFill>
-                  <a:srgbClr val="000000"/>
-                </a:solidFill>
-                <a:latin typeface="Courier New"/>
-                <a:ea typeface="DejaVu Sans"/>
-              </a:rPr>
-              <a:t>(cesdmodel)</a:t>
-            </a:r>
-            <a:endParaRPr lang="en-US" sz="1200" b="0" strike="noStrike" spc="-1" dirty="0">
-              <a:latin typeface="Arial"/>
-            </a:endParaRPr>
-          </a:p>
-          <a:p>
-            <a:pPr>
-              <a:lnSpc>
-                <a:spcPct val="100000"/>
-              </a:lnSpc>
-            </a:pPr>
-            <a:r>
-              <a:rPr lang="en-US" sz="1200" b="1" strike="noStrike" spc="-1" dirty="0" err="1">
-                <a:solidFill>
-                  <a:srgbClr val="000000"/>
-                </a:solidFill>
-                <a:latin typeface="Courier New"/>
-                <a:ea typeface="DejaVu Sans"/>
-              </a:rPr>
-              <a:t>rsquared</a:t>
-            </a:r>
-            <a:r>
-              <a:rPr lang="en-US" sz="1200" b="1" strike="noStrike" spc="-1" dirty="0">
-                <a:solidFill>
-                  <a:srgbClr val="000000"/>
-                </a:solidFill>
-                <a:latin typeface="Courier New"/>
-                <a:ea typeface="DejaVu Sans"/>
-              </a:rPr>
-              <a:t>(cesdmodel)</a:t>
-            </a:r>
-            <a:endParaRPr lang="en-US" sz="1200" b="0" strike="noStrike" spc="-1" dirty="0">
-              <a:latin typeface="Arial"/>
-            </a:endParaRPr>
-          </a:p>
-          <a:p>
-            <a:pPr>
-              <a:lnSpc>
-                <a:spcPct val="150000"/>
-              </a:lnSpc>
-            </a:pPr>
-            <a:r>
-              <a:rPr lang="en-US" sz="1200" b="0" strike="noStrike" spc="-1" dirty="0">
-                <a:solidFill>
-                  <a:srgbClr val="000000"/>
-                </a:solidFill>
-                <a:latin typeface="Arial"/>
-                <a:ea typeface="DejaVu Sans"/>
-              </a:rPr>
-              <a:t>Diagnostics; plot residuals</a:t>
-            </a:r>
-            <a:endParaRPr lang="en-US" sz="1200" b="0" strike="noStrike" spc="-1" dirty="0">
-              <a:latin typeface="Arial"/>
-            </a:endParaRPr>
-          </a:p>
-          <a:p>
-            <a:pPr>
-              <a:lnSpc>
-                <a:spcPct val="100000"/>
-              </a:lnSpc>
-            </a:pPr>
-            <a:r>
-              <a:rPr lang="en-US" sz="1200" b="1" strike="noStrike" spc="-1" dirty="0" err="1">
-                <a:solidFill>
-                  <a:srgbClr val="000000"/>
-                </a:solidFill>
-                <a:latin typeface="Courier New"/>
-                <a:ea typeface="DejaVu Sans"/>
-              </a:rPr>
-              <a:t>gf_dhistogram</a:t>
-            </a:r>
-            <a:r>
-              <a:rPr lang="en-US" sz="1200" b="1" strike="noStrike" spc="-1" dirty="0">
-                <a:solidFill>
-                  <a:srgbClr val="000000"/>
-                </a:solidFill>
-                <a:latin typeface="Courier New"/>
-                <a:ea typeface="DejaVu Sans"/>
-              </a:rPr>
-              <a:t>(~</a:t>
-            </a:r>
-            <a:r>
-              <a:rPr lang="en-US" sz="1200" b="1" strike="noStrike" spc="-1" dirty="0" err="1">
-                <a:solidFill>
-                  <a:srgbClr val="000000"/>
-                </a:solidFill>
-                <a:latin typeface="Courier New"/>
-                <a:ea typeface="DejaVu Sans"/>
+              <a:rPr lang="en-US" sz="1200" b="1" spc="-1" dirty="0" err="1">
+                <a:solidFill>
+                  <a:srgbClr val="000000"/>
+                </a:solidFill>
+                <a:latin typeface="Courier New"/>
               </a:rPr>
               <a:t>resid</a:t>
             </a:r>
             <a:r>
-              <a:rPr lang="en-US" sz="1200" b="1" strike="noStrike" spc="-1" dirty="0">
-                <a:solidFill>
-                  <a:srgbClr val="000000"/>
-                </a:solidFill>
-                <a:latin typeface="Courier New"/>
-                <a:ea typeface="DejaVu Sans"/>
+              <a:rPr lang="en-US" sz="1200" b="1" spc="-1" dirty="0">
+                <a:solidFill>
+                  <a:srgbClr val="000000"/>
+                </a:solidFill>
+                <a:latin typeface="Courier New"/>
               </a:rPr>
               <a:t>(</a:t>
             </a:r>
             <a:r>
-              <a:rPr lang="en-US" sz="1200" b="1" strike="noStrike" spc="-1" dirty="0" err="1">
-                <a:solidFill>
-                  <a:srgbClr val="000000"/>
-                </a:solidFill>
-                <a:latin typeface="Courier New"/>
-                <a:ea typeface="DejaVu Sans"/>
+              <a:rPr lang="en-US" sz="1200" b="1" spc="-1" dirty="0" err="1">
+                <a:solidFill>
+                  <a:srgbClr val="000000"/>
+                </a:solidFill>
+                <a:latin typeface="Courier New"/>
               </a:rPr>
               <a:t>cesdmodel</a:t>
             </a:r>
             <a:r>
-              <a:rPr lang="en-US" sz="1200" b="1" strike="noStrike" spc="-1" dirty="0">
-                <a:solidFill>
-                  <a:srgbClr val="000000"/>
-                </a:solidFill>
-                <a:latin typeface="Courier New"/>
-                <a:ea typeface="DejaVu Sans"/>
+              <a:rPr lang="en-US" sz="1200" b="1" spc="-1" dirty="0">
+                <a:solidFill>
+                  <a:srgbClr val="000000"/>
+                </a:solidFill>
+                <a:latin typeface="Courier New"/>
+              </a:rPr>
+              <a:t>) ~   </a:t>
+            </a:r>
+          </a:p>
+          <a:p>
+            <a:pPr>
+              <a:lnSpc>
+                <a:spcPct val="100000"/>
+              </a:lnSpc>
+            </a:pPr>
+            <a:r>
+              <a:rPr lang="en-US" sz="1200" b="1" spc="-1" dirty="0">
+                <a:solidFill>
+                  <a:srgbClr val="000000"/>
+                </a:solidFill>
+                <a:latin typeface="Courier New"/>
+              </a:rPr>
+              <a:t>    </a:t>
+            </a:r>
+            <a:r>
+              <a:rPr lang="en-US" sz="1200" b="1" spc="-1" dirty="0" smtClean="0">
+                <a:solidFill>
+                  <a:srgbClr val="000000"/>
+                </a:solidFill>
+                <a:latin typeface="Courier New"/>
+              </a:rPr>
+              <a:t>fitted(</a:t>
+            </a:r>
+            <a:r>
+              <a:rPr lang="en-US" sz="1200" b="1" spc="-1" dirty="0" err="1" smtClean="0">
+                <a:solidFill>
+                  <a:srgbClr val="000000"/>
+                </a:solidFill>
+                <a:latin typeface="Courier New"/>
+              </a:rPr>
+              <a:t>cesdmodel</a:t>
+            </a:r>
+            <a:r>
+              <a:rPr lang="en-US" sz="1200" b="1" spc="-1" dirty="0" smtClean="0">
+                <a:solidFill>
+                  <a:srgbClr val="000000"/>
+                </a:solidFill>
+                <a:latin typeface="Courier New"/>
               </a:rPr>
               <a:t>))</a:t>
             </a:r>
-            <a:endParaRPr lang="en-US" sz="1200" b="0" strike="noStrike" spc="-1" dirty="0">
-              <a:latin typeface="Arial"/>
-            </a:endParaRPr>
-          </a:p>
-          <a:p>
-            <a:pPr>
-              <a:lnSpc>
-                <a:spcPct val="100000"/>
-              </a:lnSpc>
-            </a:pPr>
-            <a:r>
-              <a:rPr lang="en-US" sz="1200" b="1" spc="-1" dirty="0" err="1">
-                <a:solidFill>
-                  <a:srgbClr val="000000"/>
-                </a:solidFill>
-                <a:latin typeface="Courier New"/>
-                <a:ea typeface="DejaVu Sans"/>
-              </a:rPr>
-              <a:t>g</a:t>
-            </a:r>
-            <a:r>
-              <a:rPr lang="en-US" sz="1200" b="1" strike="noStrike" spc="-1" dirty="0" err="1">
-                <a:solidFill>
-                  <a:srgbClr val="000000"/>
-                </a:solidFill>
-                <a:latin typeface="Courier New"/>
-                <a:ea typeface="DejaVu Sans"/>
-              </a:rPr>
-              <a:t>f_qq</a:t>
-            </a:r>
-            <a:r>
-              <a:rPr lang="en-US" sz="1200" b="1" strike="noStrike" spc="-1" dirty="0">
-                <a:solidFill>
-                  <a:srgbClr val="000000"/>
-                </a:solidFill>
-                <a:latin typeface="Courier New"/>
-                <a:ea typeface="DejaVu Sans"/>
-              </a:rPr>
-              <a:t>(~</a:t>
-            </a:r>
-            <a:r>
-              <a:rPr lang="en-US" sz="1200" b="1" strike="noStrike" spc="-1" dirty="0" err="1">
-                <a:solidFill>
-                  <a:srgbClr val="000000"/>
-                </a:solidFill>
-                <a:latin typeface="Courier New"/>
-                <a:ea typeface="DejaVu Sans"/>
-              </a:rPr>
-              <a:t>resid</a:t>
-            </a:r>
-            <a:r>
-              <a:rPr lang="en-US" sz="1200" b="1" strike="noStrike" spc="-1" dirty="0">
-                <a:solidFill>
-                  <a:srgbClr val="000000"/>
-                </a:solidFill>
-                <a:latin typeface="Courier New"/>
-                <a:ea typeface="DejaVu Sans"/>
-              </a:rPr>
-              <a:t>(cesdmodel))</a:t>
-            </a:r>
-            <a:endParaRPr lang="en-US" sz="1200" b="0" strike="noStrike" spc="-1" dirty="0">
-              <a:latin typeface="Arial"/>
-            </a:endParaRPr>
-          </a:p>
-          <a:p>
-            <a:pPr>
-              <a:lnSpc>
-                <a:spcPct val="150000"/>
-              </a:lnSpc>
-            </a:pPr>
-            <a:r>
-              <a:rPr lang="en-US" sz="1200" b="0" strike="noStrike" spc="-1" dirty="0">
-                <a:solidFill>
-                  <a:srgbClr val="000000"/>
-                </a:solidFill>
-                <a:latin typeface="Arial"/>
-                <a:ea typeface="DejaVu Sans"/>
-              </a:rPr>
-              <a:t>Diagnostics; plot residuals vs. fitted</a:t>
-            </a:r>
-            <a:endParaRPr lang="en-US" sz="1200" b="0" strike="noStrike" spc="-1" dirty="0">
-              <a:latin typeface="Arial"/>
-            </a:endParaRPr>
-          </a:p>
-          <a:p>
-            <a:pPr>
-              <a:lnSpc>
-                <a:spcPct val="100000"/>
-              </a:lnSpc>
-            </a:pPr>
-            <a:r>
-              <a:rPr lang="en-US" sz="1200" b="1" spc="-1" dirty="0" err="1">
-                <a:solidFill>
-                  <a:srgbClr val="000000"/>
-                </a:solidFill>
-                <a:latin typeface="Courier New"/>
-              </a:rPr>
-              <a:t>gf_point</a:t>
-            </a:r>
-            <a:r>
-              <a:rPr lang="en-US" sz="1200" b="1" spc="-1" dirty="0">
-                <a:solidFill>
-                  <a:srgbClr val="000000"/>
-                </a:solidFill>
-                <a:latin typeface="Courier New"/>
-              </a:rPr>
-              <a:t>(</a:t>
-            </a:r>
-            <a:r>
-              <a:rPr lang="en-US" sz="1200" b="1" spc="-1" dirty="0" err="1">
-                <a:solidFill>
-                  <a:srgbClr val="000000"/>
-                </a:solidFill>
-                <a:latin typeface="Courier New"/>
-              </a:rPr>
-              <a:t>resid</a:t>
-            </a:r>
-            <a:r>
-              <a:rPr lang="en-US" sz="1200" b="1" spc="-1" dirty="0">
-                <a:solidFill>
-                  <a:srgbClr val="000000"/>
-                </a:solidFill>
-                <a:latin typeface="Courier New"/>
-              </a:rPr>
-              <a:t>(</a:t>
-            </a:r>
-            <a:r>
-              <a:rPr lang="en-US" sz="1200" b="1" spc="-1" dirty="0" err="1">
-                <a:solidFill>
-                  <a:srgbClr val="000000"/>
-                </a:solidFill>
-                <a:latin typeface="Courier New"/>
-              </a:rPr>
-              <a:t>cesdmodel</a:t>
-            </a:r>
-            <a:r>
-              <a:rPr lang="en-US" sz="1200" b="1" spc="-1" dirty="0">
-                <a:solidFill>
-                  <a:srgbClr val="000000"/>
-                </a:solidFill>
-                <a:latin typeface="Courier New"/>
-              </a:rPr>
-              <a:t>) ~   </a:t>
-            </a:r>
-          </a:p>
-          <a:p>
-            <a:pPr>
-              <a:lnSpc>
-                <a:spcPct val="100000"/>
-              </a:lnSpc>
-            </a:pPr>
-            <a:r>
-              <a:rPr lang="en-US" sz="1200" b="1" spc="-1" dirty="0">
-                <a:solidFill>
-                  <a:srgbClr val="000000"/>
-                </a:solidFill>
-                <a:latin typeface="Courier New"/>
-              </a:rPr>
-              <a:t>    fitted(</a:t>
-            </a:r>
-            <a:r>
-              <a:rPr lang="en-US" sz="1200" b="1" spc="-1" dirty="0" err="1">
-                <a:solidFill>
-                  <a:srgbClr val="000000"/>
-                </a:solidFill>
-                <a:latin typeface="Courier New"/>
-              </a:rPr>
-              <a:t>cesdmodel</a:t>
-            </a:r>
-            <a:r>
-              <a:rPr lang="en-US" sz="1200" b="1" spc="-1" dirty="0">
-                <a:solidFill>
-                  <a:srgbClr val="000000"/>
-                </a:solidFill>
-                <a:latin typeface="Courier New"/>
-              </a:rPr>
-              <a:t>)) %&gt;%</a:t>
-            </a:r>
-          </a:p>
-          <a:p>
-            <a:pPr>
-              <a:lnSpc>
-                <a:spcPct val="100000"/>
-              </a:lnSpc>
-            </a:pPr>
-            <a:r>
-              <a:rPr lang="en-US" sz="1200" b="1" spc="-1" dirty="0">
-                <a:solidFill>
-                  <a:srgbClr val="000000"/>
-                </a:solidFill>
-                <a:latin typeface="Courier New"/>
-              </a:rPr>
-              <a:t>  </a:t>
-            </a:r>
-            <a:r>
-              <a:rPr lang="en-US" sz="1200" b="1" spc="-1" dirty="0" err="1">
-                <a:solidFill>
-                  <a:srgbClr val="000000"/>
-                </a:solidFill>
-                <a:latin typeface="Courier New"/>
-              </a:rPr>
-              <a:t>gf_lm</a:t>
-            </a:r>
-            <a:r>
-              <a:rPr lang="en-US" sz="1200" b="1" spc="-1" dirty="0">
-                <a:solidFill>
-                  <a:srgbClr val="000000"/>
-                </a:solidFill>
-                <a:latin typeface="Courier New"/>
-              </a:rPr>
-              <a:t>(size = 2) </a:t>
-            </a:r>
-          </a:p>
-          <a:p>
-            <a:pPr>
-              <a:lnSpc>
-                <a:spcPct val="100000"/>
-              </a:lnSpc>
-            </a:pPr>
             <a:endParaRPr lang="en-US" sz="1200" b="0" strike="noStrike" spc="-1" dirty="0">
               <a:latin typeface="Arial"/>
             </a:endParaRPr>
@@ -12121,7 +11998,7 @@
         </p:nvSpPr>
         <p:spPr>
           <a:xfrm>
-            <a:off x="6895964" y="7772400"/>
+            <a:off x="6920200" y="7584758"/>
             <a:ext cx="3200400" cy="694440"/>
           </a:xfrm>
           <a:prstGeom prst="roundRect">
@@ -14250,8 +14127,8 @@
         </p:nvSpPr>
         <p:spPr>
           <a:xfrm>
-            <a:off x="6895964" y="8537383"/>
-            <a:ext cx="3200400" cy="1735649"/>
+            <a:off x="6895964" y="8332857"/>
+            <a:ext cx="3200400" cy="1940176"/>
           </a:xfrm>
           <a:prstGeom prst="rect">
             <a:avLst/>
@@ -14288,7 +14165,7 @@
               </a:lnSpc>
             </a:pPr>
             <a:r>
-              <a:rPr lang="en-US" sz="1200" b="0" strike="noStrike" spc="-1" smtClean="0">
+              <a:rPr lang="en-US" sz="1200" b="0" strike="noStrike" spc="-1" dirty="0" smtClean="0">
                 <a:solidFill>
                   <a:srgbClr val="000000"/>
                 </a:solidFill>
@@ -14435,6 +14312,16 @@
               </a:lnSpc>
             </a:pPr>
             <a:r>
+              <a:rPr lang="en-US" sz="1200" b="1" strike="noStrike" spc="-1" dirty="0">
+                <a:solidFill>
+                  <a:srgbClr val="000000"/>
+                </a:solidFill>
+                <a:latin typeface="Courier New"/>
+                <a:ea typeface="Menlo"/>
+              </a:rPr>
+              <a:t>msummary(</a:t>
+            </a:r>
+            <a:r>
               <a:rPr lang="en-US" sz="1200" b="1" strike="noStrike" spc="-1" dirty="0" err="1">
                 <a:solidFill>
                   <a:srgbClr val="000000"/>
@@ -14442,7 +14329,7 @@
                 <a:latin typeface="Courier New"/>
                 <a:ea typeface="Menlo"/>
               </a:rPr>
-              <a:t>msummary</a:t>
+              <a:t>logit_mod</a:t>
             </a:r>
             <a:r>
               <a:rPr lang="en-US" sz="1200" b="1" strike="noStrike" spc="-1" dirty="0">
@@ -14452,10 +14339,66 @@
                 <a:latin typeface="Courier New"/>
                 <a:ea typeface="Menlo"/>
               </a:rPr>
+              <a:t>)</a:t>
+            </a:r>
+          </a:p>
+          <a:p>
+            <a:pPr>
+              <a:lnSpc>
+                <a:spcPct val="150000"/>
+              </a:lnSpc>
+            </a:pPr>
+            <a:r>
+              <a:rPr lang="en-US" sz="1200" b="0" strike="noStrike" spc="-1" dirty="0" smtClean="0">
+                <a:solidFill>
+                  <a:srgbClr val="000000"/>
+                </a:solidFill>
+                <a:latin typeface="Arial"/>
+                <a:ea typeface="DejaVu Sans"/>
+              </a:rPr>
+              <a:t>Odds ratios and confidence intervals</a:t>
+            </a:r>
+          </a:p>
+          <a:p>
+            <a:r>
+              <a:rPr lang="en-US" sz="1200" b="1" spc="-1" dirty="0" smtClean="0">
+                <a:latin typeface="Courier New" panose="02070309020205020404" pitchFamily="49" charset="0"/>
+                <a:cs typeface="Courier New" panose="02070309020205020404" pitchFamily="49" charset="0"/>
+              </a:rPr>
+              <a:t>library(broom)</a:t>
+            </a:r>
+            <a:endParaRPr lang="en-US" sz="1200" b="0" strike="noStrike" spc="-1" dirty="0">
+              <a:latin typeface="Arial"/>
+            </a:endParaRPr>
+          </a:p>
+          <a:p>
+            <a:pPr>
+              <a:lnSpc>
+                <a:spcPct val="100000"/>
+              </a:lnSpc>
+            </a:pPr>
+            <a:r>
+              <a:rPr lang="en-US" sz="1200" b="1" spc="-1" dirty="0" smtClean="0">
+                <a:solidFill>
+                  <a:srgbClr val="000000"/>
+                </a:solidFill>
+                <a:latin typeface="Courier New"/>
+                <a:ea typeface="Menlo"/>
+              </a:rPr>
+              <a:t>tidy</a:t>
+            </a:r>
+            <a:r>
+              <a:rPr lang="en-US" sz="1200" b="1" strike="noStrike" spc="-1" dirty="0" smtClean="0">
+                <a:solidFill>
+                  <a:srgbClr val="000000"/>
+                </a:solidFill>
+                <a:latin typeface="Courier New"/>
+                <a:ea typeface="Menlo"/>
+              </a:rPr>
               <a:t>(</a:t>
             </a:r>
             <a:r>
-              <a:rPr lang="en-US" sz="1200" b="1" strike="noStrike" spc="-1" dirty="0" err="1">
+              <a:rPr lang="en-US" sz="1200" b="1" strike="noStrike" spc="-1" dirty="0" err="1" smtClean="0">
                 <a:solidFill>
                   <a:srgbClr val="000000"/>
                 </a:solidFill>
@@ -14465,171 +14408,71 @@
               <a:t>logit_mod</a:t>
             </a:r>
             <a:r>
-              <a:rPr lang="en-US" sz="1200" b="1" strike="noStrike" spc="-1" dirty="0">
-                <a:solidFill>
-                  <a:srgbClr val="000000"/>
-                </a:solidFill>
-                <a:latin typeface="Courier New"/>
-                <a:ea typeface="Menlo"/>
-              </a:rPr>
-              <a:t>)</a:t>
-            </a:r>
-          </a:p>
-          <a:p>
-            <a:pPr>
-              <a:lnSpc>
-                <a:spcPct val="150000"/>
-              </a:lnSpc>
-            </a:pPr>
-            <a:r>
-              <a:rPr lang="en-US" sz="1200" b="0" strike="noStrike" spc="-1" dirty="0">
-                <a:solidFill>
-                  <a:srgbClr val="000000"/>
-                </a:solidFill>
-                <a:latin typeface="Arial"/>
-                <a:ea typeface="DejaVu Sans"/>
-              </a:rPr>
-              <a:t>Odds ratios and confidence intervals</a:t>
-            </a:r>
-            <a:endParaRPr lang="en-US" sz="1200" b="0" strike="noStrike" spc="-1" dirty="0">
-              <a:latin typeface="Arial"/>
-            </a:endParaRPr>
-          </a:p>
-          <a:p>
-            <a:pPr>
-              <a:lnSpc>
-                <a:spcPct val="100000"/>
-              </a:lnSpc>
-            </a:pPr>
-            <a:r>
-              <a:rPr lang="en-US" sz="1200" b="1" strike="noStrike" spc="-1" dirty="0" err="1">
-                <a:solidFill>
-                  <a:srgbClr val="000000"/>
-                </a:solidFill>
-                <a:latin typeface="Courier New"/>
-                <a:ea typeface="Menlo"/>
-              </a:rPr>
-              <a:t>exp</a:t>
-            </a:r>
-            <a:r>
-              <a:rPr lang="en-US" sz="1200" b="1" strike="noStrike" spc="-1" dirty="0">
-                <a:solidFill>
-                  <a:srgbClr val="000000"/>
-                </a:solidFill>
-                <a:latin typeface="Courier New"/>
-                <a:ea typeface="Menlo"/>
-              </a:rPr>
-              <a:t>(</a:t>
-            </a:r>
-            <a:r>
-              <a:rPr lang="en-US" sz="1200" b="1" strike="noStrike" spc="-1" dirty="0" err="1">
-                <a:solidFill>
-                  <a:srgbClr val="000000"/>
-                </a:solidFill>
-                <a:latin typeface="Courier New"/>
-                <a:ea typeface="Menlo"/>
-              </a:rPr>
-              <a:t>coef</a:t>
-            </a:r>
-            <a:r>
-              <a:rPr lang="en-US" sz="1200" b="1" strike="noStrike" spc="-1" dirty="0">
-                <a:solidFill>
-                  <a:srgbClr val="000000"/>
-                </a:solidFill>
-                <a:latin typeface="Courier New"/>
-                <a:ea typeface="Menlo"/>
-              </a:rPr>
-              <a:t>(</a:t>
-            </a:r>
-            <a:r>
-              <a:rPr lang="en-US" sz="1200" b="1" strike="noStrike" spc="-1" dirty="0" err="1">
-                <a:solidFill>
-                  <a:srgbClr val="000000"/>
-                </a:solidFill>
-                <a:latin typeface="Courier New"/>
-                <a:ea typeface="Menlo"/>
-              </a:rPr>
-              <a:t>logit_mod</a:t>
-            </a:r>
-            <a:r>
-              <a:rPr lang="en-US" sz="1200" b="1" strike="noStrike" spc="-1" dirty="0">
-                <a:solidFill>
-                  <a:srgbClr val="000000"/>
-                </a:solidFill>
-                <a:latin typeface="Courier New"/>
-                <a:ea typeface="Menlo"/>
-              </a:rPr>
-              <a:t>))</a:t>
-            </a:r>
-            <a:endParaRPr lang="en-US" sz="1200" b="0" strike="noStrike" spc="-1" dirty="0">
-              <a:latin typeface="Arial"/>
-            </a:endParaRPr>
-          </a:p>
-          <a:p>
-            <a:pPr>
-              <a:lnSpc>
-                <a:spcPct val="100000"/>
-              </a:lnSpc>
-            </a:pPr>
-            <a:r>
-              <a:rPr lang="en-US" sz="1200" b="1" strike="noStrike" spc="-1" dirty="0" err="1">
-                <a:solidFill>
-                  <a:srgbClr val="000000"/>
-                </a:solidFill>
-                <a:latin typeface="Courier New"/>
-                <a:ea typeface="Menlo"/>
-              </a:rPr>
-              <a:t>exp</a:t>
-            </a:r>
-            <a:r>
-              <a:rPr lang="en-US" sz="1200" b="1" strike="noStrike" spc="-1" dirty="0">
-                <a:solidFill>
-                  <a:srgbClr val="000000"/>
-                </a:solidFill>
-                <a:latin typeface="Courier New"/>
-                <a:ea typeface="Menlo"/>
-              </a:rPr>
-              <a:t>(</a:t>
-            </a:r>
-            <a:r>
-              <a:rPr lang="en-US" sz="1200" b="1" strike="noStrike" spc="-1" dirty="0" err="1">
-                <a:solidFill>
-                  <a:srgbClr val="000000"/>
-                </a:solidFill>
-                <a:latin typeface="Courier New"/>
-                <a:ea typeface="Menlo"/>
-              </a:rPr>
-              <a:t>confint</a:t>
-            </a:r>
-            <a:r>
-              <a:rPr lang="en-US" sz="1200" b="1" strike="noStrike" spc="-1" dirty="0">
-                <a:solidFill>
-                  <a:srgbClr val="000000"/>
-                </a:solidFill>
-                <a:latin typeface="Courier New"/>
-                <a:ea typeface="Menlo"/>
-              </a:rPr>
-              <a:t>(</a:t>
-            </a:r>
-            <a:r>
-              <a:rPr lang="en-US" sz="1200" b="1" strike="noStrike" spc="-1" dirty="0" err="1">
-                <a:solidFill>
-                  <a:srgbClr val="000000"/>
-                </a:solidFill>
-                <a:latin typeface="Courier New"/>
-                <a:ea typeface="Menlo"/>
-              </a:rPr>
-              <a:t>logit_mod</a:t>
-            </a:r>
-            <a:r>
-              <a:rPr lang="en-US" sz="1200" b="1" strike="noStrike" spc="-1" dirty="0">
-                <a:solidFill>
-                  <a:srgbClr val="000000"/>
-                </a:solidFill>
-                <a:latin typeface="Courier New"/>
-                <a:ea typeface="Menlo"/>
-              </a:rPr>
-              <a:t>))</a:t>
+              <a:rPr lang="en-US" sz="1200" b="1" strike="noStrike" spc="-1" smtClean="0">
+                <a:solidFill>
+                  <a:srgbClr val="000000"/>
+                </a:solidFill>
+                <a:latin typeface="Courier New"/>
+                <a:ea typeface="Menlo"/>
+              </a:rPr>
+              <a:t>, </a:t>
+            </a:r>
+            <a:r>
+              <a:rPr lang="en-US" sz="1200" b="1" strike="noStrike" spc="-1" smtClean="0">
+                <a:solidFill>
+                  <a:srgbClr val="000000"/>
+                </a:solidFill>
+                <a:latin typeface="Courier New"/>
+                <a:ea typeface="Menlo"/>
+              </a:rPr>
+              <a:t>conf.int </a:t>
+            </a:r>
+            <a:r>
+              <a:rPr lang="en-US" sz="1200" b="1" strike="noStrike" spc="-1" dirty="0" smtClean="0">
+                <a:solidFill>
+                  <a:srgbClr val="000000"/>
+                </a:solidFill>
+                <a:latin typeface="Courier New"/>
+                <a:ea typeface="Menlo"/>
+              </a:rPr>
+              <a:t>= TRUE,</a:t>
+            </a:r>
+          </a:p>
+          <a:p>
+            <a:pPr>
+              <a:lnSpc>
+                <a:spcPct val="100000"/>
+              </a:lnSpc>
+            </a:pPr>
+            <a:r>
+              <a:rPr lang="en-US" sz="1200" b="1" strike="noStrike" spc="-1" dirty="0" smtClean="0">
+                <a:solidFill>
+                  <a:srgbClr val="000000"/>
+                </a:solidFill>
+                <a:latin typeface="Courier New"/>
+                <a:ea typeface="Menlo"/>
+              </a:rPr>
+              <a:t>  </a:t>
+            </a:r>
+            <a:r>
+              <a:rPr lang="en-US" sz="1200" b="1" strike="noStrike" spc="-1" dirty="0" err="1" smtClean="0">
+                <a:solidFill>
+                  <a:srgbClr val="000000"/>
+                </a:solidFill>
+                <a:latin typeface="Courier New"/>
+                <a:ea typeface="Menlo"/>
+              </a:rPr>
+              <a:t>exponentiate</a:t>
+            </a:r>
+            <a:r>
+              <a:rPr lang="en-US" sz="1200" b="1" strike="noStrike" spc="-1" dirty="0" smtClean="0">
+                <a:solidFill>
+                  <a:srgbClr val="000000"/>
+                </a:solidFill>
+                <a:latin typeface="Courier New"/>
+                <a:ea typeface="Menlo"/>
+              </a:rPr>
+              <a:t> = TRUE)</a:t>
             </a:r>
             <a:endParaRPr lang="en-US" sz="1200" b="0" strike="noStrike" spc="-1" dirty="0">
               <a:latin typeface="Arial"/>
@@ -14935,7 +14778,17 @@
                 <a:latin typeface="Source Sans Pro Light"/>
                 <a:ea typeface="Source Sans Pro Light"/>
               </a:rPr>
-              <a:t> &amp; DT Kaplan •  Updated: 08/18</a:t>
+              <a:t> &amp; DT Kaplan •  Updated: </a:t>
+            </a:r>
+            <a:r>
+              <a:rPr lang="en-US" sz="900" b="0" strike="noStrike" spc="-1" dirty="0" smtClean="0">
+                <a:solidFill>
+                  <a:srgbClr val="000000"/>
+                </a:solidFill>
+                <a:latin typeface="Source Sans Pro Light"/>
+                <a:ea typeface="Source Sans Pro Light"/>
+              </a:rPr>
+              <a:t>06/20</a:t>
             </a:r>
             <a:endParaRPr lang="en-US" sz="900" b="0" strike="noStrike" spc="-1" dirty="0">
               <a:latin typeface="Arial"/>

</xml_diff>